<commit_message>
Create insecure page to test Snyk.
</commit_message>
<xml_diff>
--- a/docs/Presentation.pptx
+++ b/docs/Presentation.pptx
@@ -258,7 +258,7 @@
           <a:p>
             <a:fld id="{C0B1B5E3-F2FF-4447-9F2E-6FC79E5AC69B}" type="datetimeFigureOut">
               <a:rPr lang="en-MY" smtClean="0"/>
-              <a:t>28/1/2024</a:t>
+              <a:t>31/1/2024</a:t>
             </a:fld>
             <a:endParaRPr lang="en-MY"/>
           </a:p>
@@ -5672,7 +5672,7 @@
           </a:ln>
           <a:extLst>
             <a:ext uri="{C572A759-6A51-4108-AA02-DFA0A04FC94B}">
-              <ma14:wrappingTextBoxFlag xmlns="" xmlns:ma14="http://schemas.microsoft.com/office/mac/drawingml/2011/main" xmlns:a14="http://schemas.microsoft.com/office/drawing/2010/main" xmlns:m="http://schemas.openxmlformats.org/officeDocument/2006/math" val="1"/>
+              <ma14:wrappingTextBoxFlag xmlns:m="http://schemas.openxmlformats.org/officeDocument/2006/math" xmlns:a14="http://schemas.microsoft.com/office/drawing/2010/main" xmlns:ma14="http://schemas.microsoft.com/office/mac/drawingml/2011/main" xmlns="" val="1"/>
             </a:ext>
           </a:extLst>
         </p:spPr>
@@ -5777,7 +5777,7 @@
           </a:ln>
           <a:extLst>
             <a:ext uri="{C572A759-6A51-4108-AA02-DFA0A04FC94B}">
-              <ma14:wrappingTextBoxFlag xmlns="" xmlns:ma14="http://schemas.microsoft.com/office/mac/drawingml/2011/main" xmlns:a14="http://schemas.microsoft.com/office/drawing/2010/main" xmlns:m="http://schemas.openxmlformats.org/officeDocument/2006/math" val="1"/>
+              <ma14:wrappingTextBoxFlag xmlns:m="http://schemas.openxmlformats.org/officeDocument/2006/math" xmlns:a14="http://schemas.microsoft.com/office/drawing/2010/main" xmlns:ma14="http://schemas.microsoft.com/office/mac/drawingml/2011/main" xmlns="" val="1"/>
             </a:ext>
           </a:extLst>
         </p:spPr>
@@ -5882,7 +5882,7 @@
           </a:ln>
           <a:extLst>
             <a:ext uri="{C572A759-6A51-4108-AA02-DFA0A04FC94B}">
-              <ma14:wrappingTextBoxFlag xmlns="" xmlns:ma14="http://schemas.microsoft.com/office/mac/drawingml/2011/main" xmlns:a14="http://schemas.microsoft.com/office/drawing/2010/main" xmlns:m="http://schemas.openxmlformats.org/officeDocument/2006/math" val="1"/>
+              <ma14:wrappingTextBoxFlag xmlns:m="http://schemas.openxmlformats.org/officeDocument/2006/math" xmlns:a14="http://schemas.microsoft.com/office/drawing/2010/main" xmlns:ma14="http://schemas.microsoft.com/office/mac/drawingml/2011/main" xmlns="" val="1"/>
             </a:ext>
           </a:extLst>
         </p:spPr>
@@ -5987,7 +5987,7 @@
           </a:ln>
           <a:extLst>
             <a:ext uri="{C572A759-6A51-4108-AA02-DFA0A04FC94B}">
-              <ma14:wrappingTextBoxFlag xmlns="" xmlns:ma14="http://schemas.microsoft.com/office/mac/drawingml/2011/main" xmlns:a14="http://schemas.microsoft.com/office/drawing/2010/main" xmlns:m="http://schemas.openxmlformats.org/officeDocument/2006/math" val="1"/>
+              <ma14:wrappingTextBoxFlag xmlns:m="http://schemas.openxmlformats.org/officeDocument/2006/math" xmlns:a14="http://schemas.microsoft.com/office/drawing/2010/main" xmlns:ma14="http://schemas.microsoft.com/office/mac/drawingml/2011/main" xmlns="" val="1"/>
             </a:ext>
           </a:extLst>
         </p:spPr>
@@ -6095,7 +6095,7 @@
           </a:ln>
           <a:extLst>
             <a:ext uri="{C572A759-6A51-4108-AA02-DFA0A04FC94B}">
-              <ma14:wrappingTextBoxFlag xmlns="" xmlns:ma14="http://schemas.microsoft.com/office/mac/drawingml/2011/main" xmlns:a14="http://schemas.microsoft.com/office/drawing/2010/main" xmlns:m="http://schemas.openxmlformats.org/officeDocument/2006/math" val="1"/>
+              <ma14:wrappingTextBoxFlag xmlns:m="http://schemas.openxmlformats.org/officeDocument/2006/math" xmlns:a14="http://schemas.microsoft.com/office/drawing/2010/main" xmlns:ma14="http://schemas.microsoft.com/office/mac/drawingml/2011/main" xmlns="" val="1"/>
             </a:ext>
           </a:extLst>
         </p:spPr>
@@ -6329,7 +6329,7 @@
           </a:ln>
           <a:extLst>
             <a:ext uri="{C572A759-6A51-4108-AA02-DFA0A04FC94B}">
-              <ma14:wrappingTextBoxFlag xmlns="" xmlns:ma14="http://schemas.microsoft.com/office/mac/drawingml/2011/main" xmlns:a14="http://schemas.microsoft.com/office/drawing/2010/main" xmlns:m="http://schemas.openxmlformats.org/officeDocument/2006/math" val="1"/>
+              <ma14:wrappingTextBoxFlag xmlns:m="http://schemas.openxmlformats.org/officeDocument/2006/math" xmlns:a14="http://schemas.microsoft.com/office/drawing/2010/main" xmlns:ma14="http://schemas.microsoft.com/office/mac/drawingml/2011/main" xmlns="" val="1"/>
             </a:ext>
           </a:extLst>
         </p:spPr>
@@ -6434,7 +6434,7 @@
           </a:ln>
           <a:extLst>
             <a:ext uri="{C572A759-6A51-4108-AA02-DFA0A04FC94B}">
-              <ma14:wrappingTextBoxFlag xmlns="" xmlns:ma14="http://schemas.microsoft.com/office/mac/drawingml/2011/main" xmlns:a14="http://schemas.microsoft.com/office/drawing/2010/main" xmlns:m="http://schemas.openxmlformats.org/officeDocument/2006/math" val="1"/>
+              <ma14:wrappingTextBoxFlag xmlns:m="http://schemas.openxmlformats.org/officeDocument/2006/math" xmlns:a14="http://schemas.microsoft.com/office/drawing/2010/main" xmlns:ma14="http://schemas.microsoft.com/office/mac/drawingml/2011/main" xmlns="" val="1"/>
             </a:ext>
           </a:extLst>
         </p:spPr>
@@ -6539,7 +6539,7 @@
           </a:ln>
           <a:extLst>
             <a:ext uri="{C572A759-6A51-4108-AA02-DFA0A04FC94B}">
-              <ma14:wrappingTextBoxFlag xmlns="" xmlns:ma14="http://schemas.microsoft.com/office/mac/drawingml/2011/main" xmlns:a14="http://schemas.microsoft.com/office/drawing/2010/main" xmlns:m="http://schemas.openxmlformats.org/officeDocument/2006/math" val="1"/>
+              <ma14:wrappingTextBoxFlag xmlns:m="http://schemas.openxmlformats.org/officeDocument/2006/math" xmlns:a14="http://schemas.microsoft.com/office/drawing/2010/main" xmlns:ma14="http://schemas.microsoft.com/office/mac/drawingml/2011/main" xmlns="" val="1"/>
             </a:ext>
           </a:extLst>
         </p:spPr>
@@ -6647,7 +6647,7 @@
           </a:ln>
           <a:extLst>
             <a:ext uri="{C572A759-6A51-4108-AA02-DFA0A04FC94B}">
-              <ma14:wrappingTextBoxFlag xmlns="" xmlns:ma14="http://schemas.microsoft.com/office/mac/drawingml/2011/main" xmlns:a14="http://schemas.microsoft.com/office/drawing/2010/main" xmlns:m="http://schemas.openxmlformats.org/officeDocument/2006/math" val="1"/>
+              <ma14:wrappingTextBoxFlag xmlns:m="http://schemas.openxmlformats.org/officeDocument/2006/math" xmlns:a14="http://schemas.microsoft.com/office/drawing/2010/main" xmlns:ma14="http://schemas.microsoft.com/office/mac/drawingml/2011/main" xmlns="" val="1"/>
             </a:ext>
           </a:extLst>
         </p:spPr>
@@ -6865,7 +6865,7 @@
           </a:ln>
           <a:extLst>
             <a:ext uri="{C572A759-6A51-4108-AA02-DFA0A04FC94B}">
-              <ma14:wrappingTextBoxFlag xmlns="" xmlns:ma14="http://schemas.microsoft.com/office/mac/drawingml/2011/main" xmlns:a14="http://schemas.microsoft.com/office/drawing/2010/main" xmlns:m="http://schemas.openxmlformats.org/officeDocument/2006/math" val="1"/>
+              <ma14:wrappingTextBoxFlag xmlns:m="http://schemas.openxmlformats.org/officeDocument/2006/math" xmlns:a14="http://schemas.microsoft.com/office/drawing/2010/main" xmlns:ma14="http://schemas.microsoft.com/office/mac/drawingml/2011/main" xmlns="" val="1"/>
             </a:ext>
           </a:extLst>
         </p:spPr>
@@ -7064,7 +7064,7 @@
           </a:ln>
           <a:extLst>
             <a:ext uri="{C572A759-6A51-4108-AA02-DFA0A04FC94B}">
-              <ma14:wrappingTextBoxFlag xmlns="" xmlns:ma14="http://schemas.microsoft.com/office/mac/drawingml/2011/main" xmlns:a14="http://schemas.microsoft.com/office/drawing/2010/main" xmlns:m="http://schemas.openxmlformats.org/officeDocument/2006/math" val="1"/>
+              <ma14:wrappingTextBoxFlag xmlns:m="http://schemas.openxmlformats.org/officeDocument/2006/math" xmlns:a14="http://schemas.microsoft.com/office/drawing/2010/main" xmlns:ma14="http://schemas.microsoft.com/office/mac/drawingml/2011/main" xmlns="" val="1"/>
             </a:ext>
           </a:extLst>
         </p:spPr>
@@ -7639,7 +7639,7 @@
           </a:ln>
           <a:extLst>
             <a:ext uri="{C572A759-6A51-4108-AA02-DFA0A04FC94B}">
-              <ma14:wrappingTextBoxFlag xmlns="" xmlns:ma14="http://schemas.microsoft.com/office/mac/drawingml/2011/main" xmlns:a14="http://schemas.microsoft.com/office/drawing/2010/main" xmlns:m="http://schemas.openxmlformats.org/officeDocument/2006/math" val="1"/>
+              <ma14:wrappingTextBoxFlag xmlns:m="http://schemas.openxmlformats.org/officeDocument/2006/math" xmlns:a14="http://schemas.microsoft.com/office/drawing/2010/main" xmlns:ma14="http://schemas.microsoft.com/office/mac/drawingml/2011/main" xmlns="" val="1"/>
             </a:ext>
           </a:extLst>
         </p:spPr>
@@ -7789,7 +7789,7 @@
           </a:ln>
           <a:extLst>
             <a:ext uri="{C572A759-6A51-4108-AA02-DFA0A04FC94B}">
-              <ma14:wrappingTextBoxFlag xmlns="" xmlns:ma14="http://schemas.microsoft.com/office/mac/drawingml/2011/main" xmlns:a14="http://schemas.microsoft.com/office/drawing/2010/main" xmlns:m="http://schemas.openxmlformats.org/officeDocument/2006/math" val="1"/>
+              <ma14:wrappingTextBoxFlag xmlns:m="http://schemas.openxmlformats.org/officeDocument/2006/math" xmlns:a14="http://schemas.microsoft.com/office/drawing/2010/main" xmlns:ma14="http://schemas.microsoft.com/office/mac/drawingml/2011/main" xmlns="" val="1"/>
             </a:ext>
           </a:extLst>
         </p:spPr>
@@ -7977,7 +7977,7 @@
           </a:ln>
           <a:extLst>
             <a:ext uri="{C572A759-6A51-4108-AA02-DFA0A04FC94B}">
-              <ma14:wrappingTextBoxFlag xmlns="" xmlns:ma14="http://schemas.microsoft.com/office/mac/drawingml/2011/main" xmlns:a14="http://schemas.microsoft.com/office/drawing/2010/main" xmlns:m="http://schemas.openxmlformats.org/officeDocument/2006/math" val="1"/>
+              <ma14:wrappingTextBoxFlag xmlns:m="http://schemas.openxmlformats.org/officeDocument/2006/math" xmlns:a14="http://schemas.microsoft.com/office/drawing/2010/main" xmlns:ma14="http://schemas.microsoft.com/office/mac/drawingml/2011/main" xmlns="" val="1"/>
             </a:ext>
           </a:extLst>
         </p:spPr>
@@ -10788,7 +10788,7 @@
                 <a:ea typeface="Roboto Light" panose="02000000000000000000" pitchFamily="2" charset="0"/>
                 <a:cs typeface="Roboto Light" panose="02000000000000000000" pitchFamily="2" charset="0"/>
               </a:rPr>
-              <a:t>Continuous Delivery</a:t>
+              <a:t>Engagement Kick-Off</a:t>
             </a:r>
           </a:p>
         </p:txBody>
@@ -10849,7 +10849,7 @@
                 <a:ea typeface="Roboto" panose="02000000000000000000" pitchFamily="2" charset="0"/>
                 <a:cs typeface="Roboto" panose="02000000000000000000" pitchFamily="2" charset="0"/>
               </a:rPr>
-              <a:t>Internal Developer Platform</a:t>
+              <a:t>Scaling DevOps</a:t>
             </a:r>
           </a:p>
         </p:txBody>
@@ -10880,7 +10880,7 @@
                 <a:ea typeface="Roboto Light" panose="02000000000000000000" pitchFamily="2" charset="0"/>
                 <a:cs typeface="Roboto Light" panose="02000000000000000000" pitchFamily="2" charset="0"/>
               </a:rPr>
-              <a:t>Scaling DevOps while ensuring consistency, security, and compliance</a:t>
+              <a:t>Internal Developer Platform for speed, consistency, security, and compliance</a:t>
             </a:r>
           </a:p>
         </p:txBody>
@@ -12721,7 +12721,7 @@
                 <a:ea typeface="Roboto Light" panose="02000000000000000000" pitchFamily="2" charset="0"/>
                 <a:cs typeface="Roboto Light" panose="02000000000000000000" pitchFamily="2" charset="0"/>
               </a:rPr>
-              <a:t>Want to increase speed to create new environments</a:t>
+              <a:t>Wants to increase environment creation speed</a:t>
             </a:r>
           </a:p>
           <a:p>
@@ -15190,7 +15190,7 @@
         <p:spPr>
           <a:xfrm>
             <a:off x="7292991" y="1793774"/>
-            <a:ext cx="4073090" cy="3539430"/>
+            <a:ext cx="4073090" cy="2800767"/>
           </a:xfrm>
           <a:prstGeom prst="rect">
             <a:avLst/>
@@ -15208,58 +15208,20 @@
               <a:buChar char="•"/>
             </a:pPr>
             <a:r>
+              <a:rPr lang="en-US" sz="1600">
+                <a:latin typeface="Roboto Light" panose="02000000000000000000" pitchFamily="2" charset="0"/>
+                <a:ea typeface="Roboto Light" panose="02000000000000000000" pitchFamily="2" charset="0"/>
+                <a:cs typeface="Roboto Light" panose="02000000000000000000" pitchFamily="2" charset="0"/>
+              </a:rPr>
+              <a:t>Create </a:t>
+            </a:r>
+            <a:r>
               <a:rPr lang="en-US" sz="1600" dirty="0">
                 <a:latin typeface="Roboto Light" panose="02000000000000000000" pitchFamily="2" charset="0"/>
                 <a:ea typeface="Roboto Light" panose="02000000000000000000" pitchFamily="2" charset="0"/>
                 <a:cs typeface="Roboto Light" panose="02000000000000000000" pitchFamily="2" charset="0"/>
               </a:rPr>
-              <a:t>Shifting left / inclusion of more 3</a:t>
-            </a:r>
-            <a:r>
-              <a:rPr lang="en-US" sz="1600" baseline="30000" dirty="0">
-                <a:latin typeface="Roboto Light" panose="02000000000000000000" pitchFamily="2" charset="0"/>
-                <a:ea typeface="Roboto Light" panose="02000000000000000000" pitchFamily="2" charset="0"/>
-                <a:cs typeface="Roboto Light" panose="02000000000000000000" pitchFamily="2" charset="0"/>
-              </a:rPr>
-              <a:t>rd</a:t>
-            </a:r>
-            <a:r>
-              <a:rPr lang="en-US" sz="1600" dirty="0">
-                <a:latin typeface="Roboto Light" panose="02000000000000000000" pitchFamily="2" charset="0"/>
-                <a:ea typeface="Roboto Light" panose="02000000000000000000" pitchFamily="2" charset="0"/>
-                <a:cs typeface="Roboto Light" panose="02000000000000000000" pitchFamily="2" charset="0"/>
-              </a:rPr>
-              <a:t> party services in CI / CD process (SonarQube, </a:t>
-            </a:r>
-            <a:r>
-              <a:rPr lang="en-US" sz="1600" dirty="0" err="1">
-                <a:latin typeface="Roboto Light" panose="02000000000000000000" pitchFamily="2" charset="0"/>
-                <a:ea typeface="Roboto Light" panose="02000000000000000000" pitchFamily="2" charset="0"/>
-                <a:cs typeface="Roboto Light" panose="02000000000000000000" pitchFamily="2" charset="0"/>
-              </a:rPr>
-              <a:t>Snyk</a:t>
-            </a:r>
-            <a:r>
-              <a:rPr lang="en-US" sz="1600" dirty="0">
-                <a:latin typeface="Roboto Light" panose="02000000000000000000" pitchFamily="2" charset="0"/>
-                <a:ea typeface="Roboto Light" panose="02000000000000000000" pitchFamily="2" charset="0"/>
-                <a:cs typeface="Roboto Light" panose="02000000000000000000" pitchFamily="2" charset="0"/>
-              </a:rPr>
-              <a:t>, etc.).</a:t>
-            </a:r>
-          </a:p>
-          <a:p>
-            <a:pPr marL="285750" indent="-285750">
-              <a:buFont typeface="Arial" panose="020B0604020202020204" pitchFamily="34" charset="0"/>
-              <a:buChar char="•"/>
-            </a:pPr>
-            <a:r>
-              <a:rPr lang="en-US" sz="1600" dirty="0">
-                <a:latin typeface="Roboto Light" panose="02000000000000000000" pitchFamily="2" charset="0"/>
-                <a:ea typeface="Roboto Light" panose="02000000000000000000" pitchFamily="2" charset="0"/>
-                <a:cs typeface="Roboto Light" panose="02000000000000000000" pitchFamily="2" charset="0"/>
-              </a:rPr>
-              <a:t>Create re-usable workflows for deployment steps.</a:t>
+              <a:t>re-usable workflows for deployment steps.</a:t>
             </a:r>
           </a:p>
           <a:p>

</xml_diff>